<commit_message>
Minicourse slides (powerpoint presentations).
- ML_Minicourse-IntroCourse.pptx : Course Overview ;
- ML_Minicourse-Intro_DS.pptx : Introduction to Data Science ;
- ML_Minicourse-Intro_ML.pptx : Introduction to Machine Learning.
</commit_message>
<xml_diff>
--- a/Slides/ML_Minicourse-IntroCourse.pptx
+++ b/Slides/ML_Minicourse-IntroCourse.pptx
@@ -122,6 +122,7 @@
 <file path=ppt/revisionInfo.xml><?xml version="1.0" encoding="utf-8"?>
 <p1510:revInfo xmlns:a="http://schemas.openxmlformats.org/drawingml/2006/main" xmlns:r="http://schemas.openxmlformats.org/officeDocument/2006/relationships" xmlns:p1510="http://schemas.microsoft.com/office/powerpoint/2015/10/main">
   <p1510:revLst>
+    <p1510:client id="{6E0EC796-F161-341C-F47B-AF60FA021E75}" v="2" dt="2025-06-17T00:30:34.526"/>
     <p1510:client id="{7622F538-4744-4DAC-8BA9-30A811919B28}" v="41" dt="2025-06-16T10:23:39.389"/>
     <p1510:client id="{799AC0BB-5DCC-DB6F-EFA7-846372630E8C}" v="944" dt="2025-06-16T10:11:59.129"/>
     <p1510:client id="{E72FC89A-B59A-2A4B-76E9-3BF5F21AE21B}" v="84" dt="2025-06-16T13:14:12.925"/>
@@ -10118,6 +10119,240 @@
   <p:clrMapOvr>
     <a:masterClrMapping/>
   </p:clrMapOvr>
+  <p:timing>
+    <p:tnLst>
+      <p:par>
+        <p:cTn id="1" dur="indefinite" restart="never" nodeType="tmRoot">
+          <p:childTnLst>
+            <p:seq concurrent="1" nextAc="seek">
+              <p:cTn id="2" dur="indefinite" nodeType="mainSeq">
+                <p:childTnLst>
+                  <p:par>
+                    <p:cTn id="3" fill="hold">
+                      <p:stCondLst>
+                        <p:cond delay="indefinite"/>
+                      </p:stCondLst>
+                      <p:childTnLst>
+                        <p:par>
+                          <p:cTn id="4" fill="hold">
+                            <p:stCondLst>
+                              <p:cond delay="0"/>
+                            </p:stCondLst>
+                            <p:childTnLst>
+                              <p:par>
+                                <p:cTn id="5" presetID="1" presetClass="entr" presetSubtype="0" fill="hold" nodeType="clickEffect">
+                                  <p:stCondLst>
+                                    <p:cond delay="0"/>
+                                  </p:stCondLst>
+                                  <p:childTnLst>
+                                    <p:set>
+                                      <p:cBhvr>
+                                        <p:cTn id="6" dur="1" fill="hold">
+                                          <p:stCondLst>
+                                            <p:cond delay="0"/>
+                                          </p:stCondLst>
+                                        </p:cTn>
+                                        <p:tgtEl>
+                                          <p:spTgt spid="12"/>
+                                        </p:tgtEl>
+                                        <p:attrNameLst>
+                                          <p:attrName>style.visibility</p:attrName>
+                                        </p:attrNameLst>
+                                      </p:cBhvr>
+                                      <p:to>
+                                        <p:strVal val="visible"/>
+                                      </p:to>
+                                    </p:set>
+                                  </p:childTnLst>
+                                </p:cTn>
+                              </p:par>
+                              <p:par>
+                                <p:cTn id="7" presetID="1" presetClass="entr" presetSubtype="0" fill="hold" nodeType="withEffect">
+                                  <p:stCondLst>
+                                    <p:cond delay="0"/>
+                                  </p:stCondLst>
+                                  <p:childTnLst>
+                                    <p:set>
+                                      <p:cBhvr>
+                                        <p:cTn id="8" dur="1" fill="hold">
+                                          <p:stCondLst>
+                                            <p:cond delay="0"/>
+                                          </p:stCondLst>
+                                        </p:cTn>
+                                        <p:tgtEl>
+                                          <p:spTgt spid="11"/>
+                                        </p:tgtEl>
+                                        <p:attrNameLst>
+                                          <p:attrName>style.visibility</p:attrName>
+                                        </p:attrNameLst>
+                                      </p:cBhvr>
+                                      <p:to>
+                                        <p:strVal val="visible"/>
+                                      </p:to>
+                                    </p:set>
+                                  </p:childTnLst>
+                                </p:cTn>
+                              </p:par>
+                              <p:par>
+                                <p:cTn id="9" presetID="1" presetClass="entr" presetSubtype="0" fill="hold" grpId="0" nodeType="withEffect">
+                                  <p:stCondLst>
+                                    <p:cond delay="0"/>
+                                  </p:stCondLst>
+                                  <p:childTnLst>
+                                    <p:set>
+                                      <p:cBhvr>
+                                        <p:cTn id="10" dur="1" fill="hold">
+                                          <p:stCondLst>
+                                            <p:cond delay="0"/>
+                                          </p:stCondLst>
+                                        </p:cTn>
+                                        <p:tgtEl>
+                                          <p:spTgt spid="14"/>
+                                        </p:tgtEl>
+                                        <p:attrNameLst>
+                                          <p:attrName>style.visibility</p:attrName>
+                                        </p:attrNameLst>
+                                      </p:cBhvr>
+                                      <p:to>
+                                        <p:strVal val="visible"/>
+                                      </p:to>
+                                    </p:set>
+                                  </p:childTnLst>
+                                </p:cTn>
+                              </p:par>
+                              <p:par>
+                                <p:cTn id="11" presetID="1" presetClass="entr" presetSubtype="0" fill="hold" grpId="0" nodeType="withEffect">
+                                  <p:stCondLst>
+                                    <p:cond delay="0"/>
+                                  </p:stCondLst>
+                                  <p:childTnLst>
+                                    <p:set>
+                                      <p:cBhvr>
+                                        <p:cTn id="12" dur="1" fill="hold">
+                                          <p:stCondLst>
+                                            <p:cond delay="0"/>
+                                          </p:stCondLst>
+                                        </p:cTn>
+                                        <p:tgtEl>
+                                          <p:spTgt spid="15"/>
+                                        </p:tgtEl>
+                                        <p:attrNameLst>
+                                          <p:attrName>style.visibility</p:attrName>
+                                        </p:attrNameLst>
+                                      </p:cBhvr>
+                                      <p:to>
+                                        <p:strVal val="visible"/>
+                                      </p:to>
+                                    </p:set>
+                                  </p:childTnLst>
+                                </p:cTn>
+                              </p:par>
+                              <p:par>
+                                <p:cTn id="13" presetID="1" presetClass="entr" presetSubtype="0" fill="hold" grpId="0" nodeType="withEffect">
+                                  <p:stCondLst>
+                                    <p:cond delay="0"/>
+                                  </p:stCondLst>
+                                  <p:childTnLst>
+                                    <p:set>
+                                      <p:cBhvr>
+                                        <p:cTn id="14" dur="1" fill="hold">
+                                          <p:stCondLst>
+                                            <p:cond delay="0"/>
+                                          </p:stCondLst>
+                                        </p:cTn>
+                                        <p:tgtEl>
+                                          <p:spTgt spid="8"/>
+                                        </p:tgtEl>
+                                        <p:attrNameLst>
+                                          <p:attrName>style.visibility</p:attrName>
+                                        </p:attrNameLst>
+                                      </p:cBhvr>
+                                      <p:to>
+                                        <p:strVal val="visible"/>
+                                      </p:to>
+                                    </p:set>
+                                  </p:childTnLst>
+                                </p:cTn>
+                              </p:par>
+                            </p:childTnLst>
+                          </p:cTn>
+                        </p:par>
+                      </p:childTnLst>
+                    </p:cTn>
+                  </p:par>
+                  <p:par>
+                    <p:cTn id="15" fill="hold">
+                      <p:stCondLst>
+                        <p:cond delay="indefinite"/>
+                      </p:stCondLst>
+                      <p:childTnLst>
+                        <p:par>
+                          <p:cTn id="16" fill="hold">
+                            <p:stCondLst>
+                              <p:cond delay="0"/>
+                            </p:stCondLst>
+                            <p:childTnLst>
+                              <p:par>
+                                <p:cTn id="17" presetID="1" presetClass="entr" presetSubtype="0" fill="hold" grpId="0" nodeType="clickEffect">
+                                  <p:stCondLst>
+                                    <p:cond delay="0"/>
+                                  </p:stCondLst>
+                                  <p:childTnLst>
+                                    <p:set>
+                                      <p:cBhvr>
+                                        <p:cTn id="18" dur="1" fill="hold">
+                                          <p:stCondLst>
+                                            <p:cond delay="0"/>
+                                          </p:stCondLst>
+                                        </p:cTn>
+                                        <p:tgtEl>
+                                          <p:spTgt spid="16"/>
+                                        </p:tgtEl>
+                                        <p:attrNameLst>
+                                          <p:attrName>style.visibility</p:attrName>
+                                        </p:attrNameLst>
+                                      </p:cBhvr>
+                                      <p:to>
+                                        <p:strVal val="visible"/>
+                                      </p:to>
+                                    </p:set>
+                                  </p:childTnLst>
+                                </p:cTn>
+                              </p:par>
+                            </p:childTnLst>
+                          </p:cTn>
+                        </p:par>
+                      </p:childTnLst>
+                    </p:cTn>
+                  </p:par>
+                </p:childTnLst>
+              </p:cTn>
+              <p:prevCondLst>
+                <p:cond evt="onPrev" delay="0">
+                  <p:tgtEl>
+                    <p:sldTgt/>
+                  </p:tgtEl>
+                </p:cond>
+              </p:prevCondLst>
+              <p:nextCondLst>
+                <p:cond evt="onNext" delay="0">
+                  <p:tgtEl>
+                    <p:sldTgt/>
+                  </p:tgtEl>
+                </p:cond>
+              </p:nextCondLst>
+            </p:seq>
+          </p:childTnLst>
+        </p:cTn>
+      </p:par>
+    </p:tnLst>
+    <p:bldLst>
+      <p:bldP spid="8" grpId="0"/>
+      <p:bldP spid="14" grpId="0"/>
+      <p:bldP spid="15" grpId="0"/>
+      <p:bldP spid="16" grpId="0"/>
+    </p:bldLst>
+  </p:timing>
 </p:sld>
 </file>
 

</xml_diff>